<commit_message>
added task program exercise and solution commands; updated PPT (#44)
</commit_message>
<xml_diff>
--- a/Cloud/Lesson 05 - Intro to Containers/Containers and Images.pptx
+++ b/Cloud/Lesson 05 - Intro to Containers/Containers and Images.pptx
@@ -33,10 +33,10 @@
     <p:sldId id="391" r:id="rId24"/>
     <p:sldId id="392" r:id="rId25"/>
     <p:sldId id="364" r:id="rId26"/>
-    <p:sldId id="365" r:id="rId27"/>
-    <p:sldId id="394" r:id="rId28"/>
-    <p:sldId id="395" r:id="rId29"/>
-    <p:sldId id="396" r:id="rId30"/>
+    <p:sldId id="395" r:id="rId27"/>
+    <p:sldId id="396" r:id="rId28"/>
+    <p:sldId id="394" r:id="rId29"/>
+    <p:sldId id="365" r:id="rId30"/>
   </p:sldIdLst>
   <p:sldSz cx="12192000" cy="6858000"/>
   <p:notesSz cx="6858000" cy="9144000"/>
@@ -225,7 +225,7 @@
           <a:p>
             <a:fld id="{7D2F5B96-EC90-4B10-91AC-E32DA21E81E1}" type="datetimeFigureOut">
               <a:rPr lang="en-US" smtClean="0"/>
-              <a:t>12/23/25</a:t>
+              <a:t>1/7/2026</a:t>
             </a:fld>
             <a:endParaRPr lang="en-US"/>
           </a:p>
@@ -532,7 +532,7 @@
           <a:p>
             <a:fld id="{AD3160A9-B1E4-4AE8-B854-46ED2C2068C2}" type="datetimeFigureOut">
               <a:rPr lang="en-US" smtClean="0"/>
-              <a:t>12/23/25</a:t>
+              <a:t>1/7/2026</a:t>
             </a:fld>
             <a:endParaRPr lang="en-US"/>
           </a:p>
@@ -3949,7 +3949,7 @@
           <a:p>
             <a:fld id="{AD3160A9-B1E4-4AE8-B854-46ED2C2068C2}" type="datetimeFigureOut">
               <a:rPr lang="en-US" smtClean="0"/>
-              <a:t>12/23/25</a:t>
+              <a:t>1/7/2026</a:t>
             </a:fld>
             <a:endParaRPr lang="en-US"/>
           </a:p>
@@ -5738,7 +5738,7 @@
           <a:p>
             <a:fld id="{AD3160A9-B1E4-4AE8-B854-46ED2C2068C2}" type="datetimeFigureOut">
               <a:rPr lang="en-US" smtClean="0"/>
-              <a:t>12/23/25</a:t>
+              <a:t>1/7/2026</a:t>
             </a:fld>
             <a:endParaRPr lang="en-US"/>
           </a:p>
@@ -5916,7 +5916,7 @@
           <a:p>
             <a:fld id="{AD3160A9-B1E4-4AE8-B854-46ED2C2068C2}" type="datetimeFigureOut">
               <a:rPr lang="en-US" smtClean="0"/>
-              <a:t>12/23/25</a:t>
+              <a:t>1/7/2026</a:t>
             </a:fld>
             <a:endParaRPr lang="en-US"/>
           </a:p>
@@ -6142,7 +6142,7 @@
           <a:p>
             <a:fld id="{AD3160A9-B1E4-4AE8-B854-46ED2C2068C2}" type="datetimeFigureOut">
               <a:rPr lang="en-US" smtClean="0"/>
-              <a:t>12/23/25</a:t>
+              <a:t>1/7/2026</a:t>
             </a:fld>
             <a:endParaRPr lang="en-US"/>
           </a:p>
@@ -6431,7 +6431,7 @@
           <a:p>
             <a:fld id="{AD3160A9-B1E4-4AE8-B854-46ED2C2068C2}" type="datetimeFigureOut">
               <a:rPr lang="en-US" smtClean="0"/>
-              <a:t>12/23/25</a:t>
+              <a:t>1/7/2026</a:t>
             </a:fld>
             <a:endParaRPr lang="en-US"/>
           </a:p>
@@ -7042,7 +7042,7 @@
           <a:p>
             <a:fld id="{AD3160A9-B1E4-4AE8-B854-46ED2C2068C2}" type="datetimeFigureOut">
               <a:rPr lang="en-US" smtClean="0"/>
-              <a:t>12/23/25</a:t>
+              <a:t>1/7/2026</a:t>
             </a:fld>
             <a:endParaRPr lang="en-US"/>
           </a:p>
@@ -7901,7 +7901,7 @@
           <a:p>
             <a:fld id="{AD3160A9-B1E4-4AE8-B854-46ED2C2068C2}" type="datetimeFigureOut">
               <a:rPr lang="en-US" smtClean="0"/>
-              <a:t>12/23/25</a:t>
+              <a:t>1/7/2026</a:t>
             </a:fld>
             <a:endParaRPr lang="en-US"/>
           </a:p>
@@ -9003,7 +9003,7 @@
           <a:p>
             <a:fld id="{AD3160A9-B1E4-4AE8-B854-46ED2C2068C2}" type="datetimeFigureOut">
               <a:rPr lang="en-US" smtClean="0"/>
-              <a:t>12/23/25</a:t>
+              <a:t>1/7/2026</a:t>
             </a:fld>
             <a:endParaRPr lang="en-US"/>
           </a:p>
@@ -9306,7 +9306,7 @@
           <a:p>
             <a:fld id="{AD3160A9-B1E4-4AE8-B854-46ED2C2068C2}" type="datetimeFigureOut">
               <a:rPr lang="en-US" smtClean="0"/>
-              <a:t>12/23/25</a:t>
+              <a:t>1/7/2026</a:t>
             </a:fld>
             <a:endParaRPr lang="en-US"/>
           </a:p>
@@ -9786,7 +9786,7 @@
           <a:p>
             <a:fld id="{AD3160A9-B1E4-4AE8-B854-46ED2C2068C2}" type="datetimeFigureOut">
               <a:rPr lang="en-US" smtClean="0"/>
-              <a:t>12/23/25</a:t>
+              <a:t>1/7/2026</a:t>
             </a:fld>
             <a:endParaRPr lang="en-US"/>
           </a:p>
@@ -9927,7 +9927,7 @@
           <a:p>
             <a:fld id="{AD3160A9-B1E4-4AE8-B854-46ED2C2068C2}" type="datetimeFigureOut">
               <a:rPr lang="en-US" smtClean="0"/>
-              <a:t>12/23/25</a:t>
+              <a:t>1/7/2026</a:t>
             </a:fld>
             <a:endParaRPr lang="en-US"/>
           </a:p>
@@ -11844,7 +11844,7 @@
           <a:p>
             <a:fld id="{AD3160A9-B1E4-4AE8-B854-46ED2C2068C2}" type="datetimeFigureOut">
               <a:rPr lang="en-US" smtClean="0"/>
-              <a:t>12/23/25</a:t>
+              <a:t>1/7/2026</a:t>
             </a:fld>
             <a:endParaRPr lang="en-US"/>
           </a:p>
@@ -12140,7 +12140,7 @@
           <a:p>
             <a:fld id="{AD3160A9-B1E4-4AE8-B854-46ED2C2068C2}" type="datetimeFigureOut">
               <a:rPr lang="en-US" smtClean="0"/>
-              <a:t>12/23/25</a:t>
+              <a:t>1/7/2026</a:t>
             </a:fld>
             <a:endParaRPr lang="en-US"/>
           </a:p>
@@ -12433,7 +12433,7 @@
           <a:p>
             <a:fld id="{AD3160A9-B1E4-4AE8-B854-46ED2C2068C2}" type="datetimeFigureOut">
               <a:rPr lang="en-US" smtClean="0"/>
-              <a:t>12/23/25</a:t>
+              <a:t>1/7/2026</a:t>
             </a:fld>
             <a:endParaRPr lang="en-US"/>
           </a:p>
@@ -12948,7 +12948,7 @@
           <a:p>
             <a:fld id="{AD3160A9-B1E4-4AE8-B854-46ED2C2068C2}" type="datetimeFigureOut">
               <a:rPr lang="en-US" smtClean="0"/>
-              <a:t>12/23/25</a:t>
+              <a:t>1/7/2026</a:t>
             </a:fld>
             <a:endParaRPr lang="en-US"/>
           </a:p>
@@ -13074,7 +13074,7 @@
           <a:p>
             <a:fld id="{AD3160A9-B1E4-4AE8-B854-46ED2C2068C2}" type="datetimeFigureOut">
               <a:rPr lang="en-US" smtClean="0"/>
-              <a:t>12/23/25</a:t>
+              <a:t>1/7/2026</a:t>
             </a:fld>
             <a:endParaRPr lang="en-US"/>
           </a:p>
@@ -13200,7 +13200,7 @@
           <a:p>
             <a:fld id="{AD3160A9-B1E4-4AE8-B854-46ED2C2068C2}" type="datetimeFigureOut">
               <a:rPr lang="en-US" smtClean="0"/>
-              <a:t>12/23/25</a:t>
+              <a:t>1/7/2026</a:t>
             </a:fld>
             <a:endParaRPr lang="en-US"/>
           </a:p>
@@ -13437,7 +13437,7 @@
           <a:p>
             <a:fld id="{AD3160A9-B1E4-4AE8-B854-46ED2C2068C2}" type="datetimeFigureOut">
               <a:rPr lang="en-US" smtClean="0"/>
-              <a:t>12/23/25</a:t>
+              <a:t>1/7/2026</a:t>
             </a:fld>
             <a:endParaRPr lang="en-US"/>
           </a:p>
@@ -13541,7 +13541,7 @@
           <a:p>
             <a:fld id="{AD3160A9-B1E4-4AE8-B854-46ED2C2068C2}" type="datetimeFigureOut">
               <a:rPr lang="en-US" smtClean="0"/>
-              <a:t>12/23/25</a:t>
+              <a:t>1/7/2026</a:t>
             </a:fld>
             <a:endParaRPr lang="en-US"/>
           </a:p>
@@ -13935,7 +13935,7 @@
           <a:p>
             <a:fld id="{AD3160A9-B1E4-4AE8-B854-46ED2C2068C2}" type="datetimeFigureOut">
               <a:rPr lang="en-US" smtClean="0"/>
-              <a:t>12/23/25</a:t>
+              <a:t>1/7/2026</a:t>
             </a:fld>
             <a:endParaRPr lang="en-US"/>
           </a:p>
@@ -14202,7 +14202,7 @@
           <a:p>
             <a:fld id="{AD3160A9-B1E4-4AE8-B854-46ED2C2068C2}" type="datetimeFigureOut">
               <a:rPr lang="en-US" smtClean="0"/>
-              <a:t>12/23/25</a:t>
+              <a:t>1/7/2026</a:t>
             </a:fld>
             <a:endParaRPr lang="en-US"/>
           </a:p>
@@ -14473,7 +14473,7 @@
           <a:p>
             <a:fld id="{AD3160A9-B1E4-4AE8-B854-46ED2C2068C2}" type="datetimeFigureOut">
               <a:rPr lang="en-US" smtClean="0"/>
-              <a:t>12/23/25</a:t>
+              <a:t>1/7/2026</a:t>
             </a:fld>
             <a:endParaRPr lang="en-US"/>
           </a:p>
@@ -14738,7 +14738,7 @@
           <a:p>
             <a:fld id="{AD3160A9-B1E4-4AE8-B854-46ED2C2068C2}" type="datetimeFigureOut">
               <a:rPr lang="en-US" smtClean="0"/>
-              <a:t>12/23/25</a:t>
+              <a:t>1/7/2026</a:t>
             </a:fld>
             <a:endParaRPr lang="en-US"/>
           </a:p>
@@ -15150,7 +15150,7 @@
           <a:p>
             <a:fld id="{AD3160A9-B1E4-4AE8-B854-46ED2C2068C2}" type="datetimeFigureOut">
               <a:rPr lang="en-US" smtClean="0"/>
-              <a:t>12/23/25</a:t>
+              <a:t>1/7/2026</a:t>
             </a:fld>
             <a:endParaRPr lang="en-US"/>
           </a:p>
@@ -15438,7 +15438,7 @@
           <a:p>
             <a:fld id="{AD3160A9-B1E4-4AE8-B854-46ED2C2068C2}" type="datetimeFigureOut">
               <a:rPr lang="en-US" smtClean="0"/>
-              <a:t>12/23/25</a:t>
+              <a:t>1/7/2026</a:t>
             </a:fld>
             <a:endParaRPr lang="en-US"/>
           </a:p>
@@ -15705,7 +15705,7 @@
           <a:p>
             <a:fld id="{AD3160A9-B1E4-4AE8-B854-46ED2C2068C2}" type="datetimeFigureOut">
               <a:rPr lang="en-US" smtClean="0"/>
-              <a:t>12/23/25</a:t>
+              <a:t>1/7/2026</a:t>
             </a:fld>
             <a:endParaRPr lang="en-US"/>
           </a:p>
@@ -16032,7 +16032,7 @@
           <a:p>
             <a:fld id="{AD3160A9-B1E4-4AE8-B854-46ED2C2068C2}" type="datetimeFigureOut">
               <a:rPr lang="en-US" smtClean="0"/>
-              <a:t>12/23/25</a:t>
+              <a:t>1/7/2026</a:t>
             </a:fld>
             <a:endParaRPr lang="en-US"/>
           </a:p>
@@ -16512,7 +16512,7 @@
           <a:p>
             <a:fld id="{AD3160A9-B1E4-4AE8-B854-46ED2C2068C2}" type="datetimeFigureOut">
               <a:rPr lang="en-US" smtClean="0"/>
-              <a:t>12/23/25</a:t>
+              <a:t>1/7/2026</a:t>
             </a:fld>
             <a:endParaRPr lang="en-US"/>
           </a:p>
@@ -17148,7 +17148,7 @@
           <a:p>
             <a:fld id="{AD3160A9-B1E4-4AE8-B854-46ED2C2068C2}" type="datetimeFigureOut">
               <a:rPr lang="en-US" smtClean="0"/>
-              <a:t>12/23/25</a:t>
+              <a:t>1/7/2026</a:t>
             </a:fld>
             <a:endParaRPr lang="en-US"/>
           </a:p>
@@ -18197,7 +18197,7 @@
           <a:p>
             <a:fld id="{AD3160A9-B1E4-4AE8-B854-46ED2C2068C2}" type="datetimeFigureOut">
               <a:rPr lang="en-US" smtClean="0"/>
-              <a:t>12/23/25</a:t>
+              <a:t>1/7/2026</a:t>
             </a:fld>
             <a:endParaRPr lang="en-US"/>
           </a:p>
@@ -19219,7 +19219,7 @@
           <a:p>
             <a:fld id="{AD3160A9-B1E4-4AE8-B854-46ED2C2068C2}" type="datetimeFigureOut">
               <a:rPr lang="en-US" smtClean="0"/>
-              <a:t>12/23/25</a:t>
+              <a:t>1/7/2026</a:t>
             </a:fld>
             <a:endParaRPr lang="en-US"/>
           </a:p>
@@ -19575,7 +19575,7 @@
           <a:p>
             <a:fld id="{AD3160A9-B1E4-4AE8-B854-46ED2C2068C2}" type="datetimeFigureOut">
               <a:rPr lang="en-US" smtClean="0"/>
-              <a:t>12/23/25</a:t>
+              <a:t>1/7/2026</a:t>
             </a:fld>
             <a:endParaRPr lang="en-US"/>
           </a:p>
@@ -20151,7 +20151,7 @@
                   <a:schemeClr val="tx2"/>
                 </a:solidFill>
               </a:rPr>
-              <a:t>23 December 2025</a:t>
+              <a:t>7 January 2026</a:t>
             </a:fld>
             <a:endParaRPr lang="en-US" dirty="0">
               <a:solidFill>
@@ -23503,7 +23503,7 @@
           <p:cNvPr id="6" name="Title 5">
             <a:extLst>
               <a:ext uri="{FF2B5EF4-FFF2-40B4-BE49-F238E27FC236}">
-                <a16:creationId xmlns:a16="http://schemas.microsoft.com/office/drawing/2014/main" id="{282EA3DB-FEE0-084F-E004-49822CEBE342}"/>
+                <a16:creationId xmlns:a16="http://schemas.microsoft.com/office/drawing/2014/main" id="{BD92EEC7-97E8-3C84-E478-FE95C1403415}"/>
               </a:ext>
             </a:extLst>
           </p:cNvPr>
@@ -23521,25 +23521,25 @@
           <a:p>
             <a:r>
               <a:rPr lang="en-US" dirty="0"/>
-              <a:t>Docker Demo</a:t>
-            </a:r>
-          </a:p>
-        </p:txBody>
-      </p:sp>
-      <p:sp>
-        <p:nvSpPr>
-          <p:cNvPr id="5" name="Slide Number Placeholder 4">
-            <a:extLst>
-              <a:ext uri="{FF2B5EF4-FFF2-40B4-BE49-F238E27FC236}">
-                <a16:creationId xmlns:a16="http://schemas.microsoft.com/office/drawing/2014/main" id="{024D4CF2-3ED5-B401-BBAC-FA85B485C45F}"/>
-              </a:ext>
-            </a:extLst>
-          </p:cNvPr>
-          <p:cNvSpPr>
-            <a:spLocks noGrp="1"/>
-          </p:cNvSpPr>
-          <p:nvPr>
-            <p:ph type="sldNum" sz="quarter" idx="11"/>
+              <a:t>Container vs Image</a:t>
+            </a:r>
+          </a:p>
+        </p:txBody>
+      </p:sp>
+      <p:sp>
+        <p:nvSpPr>
+          <p:cNvPr id="7" name="Content Placeholder 6">
+            <a:extLst>
+              <a:ext uri="{FF2B5EF4-FFF2-40B4-BE49-F238E27FC236}">
+                <a16:creationId xmlns:a16="http://schemas.microsoft.com/office/drawing/2014/main" id="{9FB1E5C2-D011-16F5-56BC-7DB2635A7B01}"/>
+              </a:ext>
+            </a:extLst>
+          </p:cNvPr>
+          <p:cNvSpPr>
+            <a:spLocks noGrp="1"/>
+          </p:cNvSpPr>
+          <p:nvPr>
+            <p:ph idx="1"/>
           </p:nvPr>
         </p:nvSpPr>
         <p:spPr/>
@@ -23547,376 +23547,87 @@
           <a:bodyPr/>
           <a:lstStyle/>
           <a:p>
+            <a:r>
+              <a:rPr lang="en-US" dirty="0"/>
+              <a:t>Containers run from immutable images</a:t>
+            </a:r>
+          </a:p>
+          <a:p>
+            <a:r>
+              <a:rPr lang="en-US" dirty="0"/>
+              <a:t>So how are we writing a file???</a:t>
+            </a:r>
+          </a:p>
+          <a:p>
+            <a:r>
+              <a:rPr lang="en-US" dirty="0"/>
+              <a:t>Each container gets a R/W layer that is shimmed on top of the images</a:t>
+            </a:r>
+          </a:p>
+          <a:p>
+            <a:pPr lvl="1"/>
+            <a:r>
+              <a:rPr lang="en-US" dirty="0"/>
+              <a:t>R/W layer </a:t>
+            </a:r>
+            <a:r>
+              <a:rPr lang="en-US" i="1" dirty="0"/>
+              <a:t>saved</a:t>
+            </a:r>
+            <a:r>
+              <a:rPr lang="en-US" dirty="0"/>
+              <a:t> when container is </a:t>
+            </a:r>
+            <a:r>
+              <a:rPr lang="en-US" i="1" dirty="0"/>
+              <a:t>stopped</a:t>
+            </a:r>
+            <a:endParaRPr lang="en-US" dirty="0"/>
+          </a:p>
+          <a:p>
+            <a:pPr lvl="1"/>
+            <a:r>
+              <a:rPr lang="en-US" i="1" dirty="0"/>
+              <a:t>Deleted</a:t>
+            </a:r>
+            <a:r>
+              <a:rPr lang="en-US" dirty="0"/>
+              <a:t> when container is </a:t>
+            </a:r>
+            <a:r>
+              <a:rPr lang="en-US" i="1" dirty="0"/>
+              <a:t>removed</a:t>
+            </a:r>
+          </a:p>
+          <a:p>
+            <a:endParaRPr lang="en-US" dirty="0"/>
+          </a:p>
+        </p:txBody>
+      </p:sp>
+      <p:sp>
+        <p:nvSpPr>
+          <p:cNvPr id="5" name="Slide Number Placeholder 4">
+            <a:extLst>
+              <a:ext uri="{FF2B5EF4-FFF2-40B4-BE49-F238E27FC236}">
+                <a16:creationId xmlns:a16="http://schemas.microsoft.com/office/drawing/2014/main" id="{1115069B-1B32-5AE3-1060-426423F73330}"/>
+              </a:ext>
+            </a:extLst>
+          </p:cNvPr>
+          <p:cNvSpPr>
+            <a:spLocks noGrp="1"/>
+          </p:cNvSpPr>
+          <p:nvPr>
+            <p:ph type="sldNum" sz="quarter" idx="11"/>
+          </p:nvPr>
+        </p:nvSpPr>
+        <p:spPr/>
+        <p:txBody>
+          <a:bodyPr/>
+          <a:lstStyle/>
+          <a:p>
             <a:fld id="{18039B46-FA54-4B70-AC0D-4BB93E2046DD}" type="slidenum">
               <a:rPr lang="en-US" smtClean="0"/>
-              <a:pPr/>
               <a:t>26</a:t>
-            </a:fld>
-            <a:endParaRPr lang="en-US"/>
-          </a:p>
-        </p:txBody>
-      </p:sp>
-      <p:sp>
-        <p:nvSpPr>
-          <p:cNvPr id="4" name="Footer Placeholder 3">
-            <a:extLst>
-              <a:ext uri="{FF2B5EF4-FFF2-40B4-BE49-F238E27FC236}">
-                <a16:creationId xmlns:a16="http://schemas.microsoft.com/office/drawing/2014/main" id="{DE47DE72-CD17-26B1-4512-C7D7FC4E5BB3}"/>
-              </a:ext>
-            </a:extLst>
-          </p:cNvPr>
-          <p:cNvSpPr>
-            <a:spLocks noGrp="1"/>
-          </p:cNvSpPr>
-          <p:nvPr>
-            <p:ph type="ftr" sz="quarter" idx="4294967295"/>
-          </p:nvPr>
-        </p:nvSpPr>
-        <p:spPr>
-          <a:xfrm>
-            <a:off x="548640" y="1600198"/>
-            <a:ext cx="4114800" cy="365125"/>
-          </a:xfrm>
-          <a:prstGeom prst="rect">
-            <a:avLst/>
-          </a:prstGeom>
-        </p:spPr>
-        <p:txBody>
-          <a:bodyPr/>
-          <a:lstStyle/>
-          <a:p>
-            <a:r>
-              <a:rPr lang="en-US" dirty="0">
-                <a:solidFill>
-                  <a:schemeClr val="bg1"/>
-                </a:solidFill>
-              </a:rPr>
-              <a:t>https://docs.docker.com/get-started/docker_cheatsheet.pdf</a:t>
-            </a:r>
-          </a:p>
-        </p:txBody>
-      </p:sp>
-    </p:spTree>
-    <p:extLst>
-      <p:ext uri="{BB962C8B-B14F-4D97-AF65-F5344CB8AC3E}">
-        <p14:creationId xmlns:p14="http://schemas.microsoft.com/office/powerpoint/2010/main" val="1694393340"/>
-      </p:ext>
-    </p:extLst>
-  </p:cSld>
-  <p:clrMapOvr>
-    <a:masterClrMapping/>
-  </p:clrMapOvr>
-</p:sld>
-</file>
-
-<file path=ppt/slides/slide27.xml><?xml version="1.0" encoding="utf-8"?>
-<p:sld xmlns:a="http://schemas.openxmlformats.org/drawingml/2006/main" xmlns:r="http://schemas.openxmlformats.org/officeDocument/2006/relationships" xmlns:p="http://schemas.openxmlformats.org/presentationml/2006/main">
-  <p:cSld>
-    <p:spTree>
-      <p:nvGrpSpPr>
-        <p:cNvPr id="1" name=""/>
-        <p:cNvGrpSpPr/>
-        <p:nvPr/>
-      </p:nvGrpSpPr>
-      <p:grpSpPr>
-        <a:xfrm>
-          <a:off x="0" y="0"/>
-          <a:ext cx="0" cy="0"/>
-          <a:chOff x="0" y="0"/>
-          <a:chExt cx="0" cy="0"/>
-        </a:xfrm>
-      </p:grpSpPr>
-      <p:sp>
-        <p:nvSpPr>
-          <p:cNvPr id="2" name="Title 1">
-            <a:extLst>
-              <a:ext uri="{FF2B5EF4-FFF2-40B4-BE49-F238E27FC236}">
-                <a16:creationId xmlns:a16="http://schemas.microsoft.com/office/drawing/2014/main" id="{3181A64B-9ABC-3000-628A-06CF1265C556}"/>
-              </a:ext>
-            </a:extLst>
-          </p:cNvPr>
-          <p:cNvSpPr>
-            <a:spLocks noGrp="1"/>
-          </p:cNvSpPr>
-          <p:nvPr>
-            <p:ph type="title"/>
-          </p:nvPr>
-        </p:nvSpPr>
-        <p:spPr/>
-        <p:txBody>
-          <a:bodyPr/>
-          <a:lstStyle/>
-          <a:p>
-            <a:r>
-              <a:rPr lang="en-US" dirty="0"/>
-              <a:t>Another Demo</a:t>
-            </a:r>
-          </a:p>
-        </p:txBody>
-      </p:sp>
-      <p:sp>
-        <p:nvSpPr>
-          <p:cNvPr id="3" name="Content Placeholder 2">
-            <a:extLst>
-              <a:ext uri="{FF2B5EF4-FFF2-40B4-BE49-F238E27FC236}">
-                <a16:creationId xmlns:a16="http://schemas.microsoft.com/office/drawing/2014/main" id="{61E1C52B-5033-8B7F-BFF2-508D10EF1F0B}"/>
-              </a:ext>
-            </a:extLst>
-          </p:cNvPr>
-          <p:cNvSpPr>
-            <a:spLocks noGrp="1"/>
-          </p:cNvSpPr>
-          <p:nvPr>
-            <p:ph sz="half" idx="1"/>
-          </p:nvPr>
-        </p:nvSpPr>
-        <p:spPr/>
-        <p:txBody>
-          <a:bodyPr/>
-          <a:lstStyle/>
-          <a:p>
-            <a:r>
-              <a:rPr lang="en-US" dirty="0"/>
-              <a:t>docker container run -it alpine</a:t>
-            </a:r>
-          </a:p>
-          <a:p>
-            <a:r>
-              <a:rPr lang="en-US" dirty="0"/>
-              <a:t>echo hello &gt; test.txt</a:t>
-            </a:r>
-          </a:p>
-          <a:p>
-            <a:r>
-              <a:rPr lang="en-US" dirty="0"/>
-              <a:t>cat test.txt</a:t>
-            </a:r>
-          </a:p>
-          <a:p>
-            <a:r>
-              <a:rPr lang="en-US" dirty="0"/>
-              <a:t>Use docker desktop to inspect filesystem</a:t>
-            </a:r>
-          </a:p>
-          <a:p>
-            <a:endParaRPr lang="en-US" dirty="0"/>
-          </a:p>
-        </p:txBody>
-      </p:sp>
-      <p:sp>
-        <p:nvSpPr>
-          <p:cNvPr id="5" name="Footer Placeholder 4">
-            <a:extLst>
-              <a:ext uri="{FF2B5EF4-FFF2-40B4-BE49-F238E27FC236}">
-                <a16:creationId xmlns:a16="http://schemas.microsoft.com/office/drawing/2014/main" id="{5B9FAC41-9DED-93AD-F4A4-74C637581EC2}"/>
-              </a:ext>
-            </a:extLst>
-          </p:cNvPr>
-          <p:cNvSpPr>
-            <a:spLocks noGrp="1"/>
-          </p:cNvSpPr>
-          <p:nvPr>
-            <p:ph type="ftr" sz="quarter" idx="11"/>
-          </p:nvPr>
-        </p:nvSpPr>
-        <p:spPr/>
-        <p:txBody>
-          <a:bodyPr/>
-          <a:lstStyle/>
-          <a:p>
-            <a:endParaRPr lang="en-US"/>
-          </a:p>
-        </p:txBody>
-      </p:sp>
-      <p:sp>
-        <p:nvSpPr>
-          <p:cNvPr id="6" name="Slide Number Placeholder 5">
-            <a:extLst>
-              <a:ext uri="{FF2B5EF4-FFF2-40B4-BE49-F238E27FC236}">
-                <a16:creationId xmlns:a16="http://schemas.microsoft.com/office/drawing/2014/main" id="{872139EB-8E23-4F7B-F020-13312A40CFC9}"/>
-              </a:ext>
-            </a:extLst>
-          </p:cNvPr>
-          <p:cNvSpPr>
-            <a:spLocks noGrp="1"/>
-          </p:cNvSpPr>
-          <p:nvPr>
-            <p:ph type="sldNum" sz="quarter" idx="12"/>
-          </p:nvPr>
-        </p:nvSpPr>
-        <p:spPr/>
-        <p:txBody>
-          <a:bodyPr/>
-          <a:lstStyle/>
-          <a:p>
-            <a:fld id="{18039B46-FA54-4B70-AC0D-4BB93E2046DD}" type="slidenum">
-              <a:rPr lang="en-US" smtClean="0"/>
-              <a:t>27</a:t>
-            </a:fld>
-            <a:endParaRPr lang="en-US"/>
-          </a:p>
-        </p:txBody>
-      </p:sp>
-    </p:spTree>
-    <p:extLst>
-      <p:ext uri="{BB962C8B-B14F-4D97-AF65-F5344CB8AC3E}">
-        <p14:creationId xmlns:p14="http://schemas.microsoft.com/office/powerpoint/2010/main" val="1179256607"/>
-      </p:ext>
-    </p:extLst>
-  </p:cSld>
-  <p:clrMapOvr>
-    <a:masterClrMapping/>
-  </p:clrMapOvr>
-</p:sld>
-</file>
-
-<file path=ppt/slides/slide28.xml><?xml version="1.0" encoding="utf-8"?>
-<p:sld xmlns:a="http://schemas.openxmlformats.org/drawingml/2006/main" xmlns:r="http://schemas.openxmlformats.org/officeDocument/2006/relationships" xmlns:p="http://schemas.openxmlformats.org/presentationml/2006/main">
-  <p:cSld>
-    <p:spTree>
-      <p:nvGrpSpPr>
-        <p:cNvPr id="1" name=""/>
-        <p:cNvGrpSpPr/>
-        <p:nvPr/>
-      </p:nvGrpSpPr>
-      <p:grpSpPr>
-        <a:xfrm>
-          <a:off x="0" y="0"/>
-          <a:ext cx="0" cy="0"/>
-          <a:chOff x="0" y="0"/>
-          <a:chExt cx="0" cy="0"/>
-        </a:xfrm>
-      </p:grpSpPr>
-      <p:sp>
-        <p:nvSpPr>
-          <p:cNvPr id="6" name="Title 5">
-            <a:extLst>
-              <a:ext uri="{FF2B5EF4-FFF2-40B4-BE49-F238E27FC236}">
-                <a16:creationId xmlns:a16="http://schemas.microsoft.com/office/drawing/2014/main" id="{BD92EEC7-97E8-3C84-E478-FE95C1403415}"/>
-              </a:ext>
-            </a:extLst>
-          </p:cNvPr>
-          <p:cNvSpPr>
-            <a:spLocks noGrp="1"/>
-          </p:cNvSpPr>
-          <p:nvPr>
-            <p:ph type="title"/>
-          </p:nvPr>
-        </p:nvSpPr>
-        <p:spPr/>
-        <p:txBody>
-          <a:bodyPr/>
-          <a:lstStyle/>
-          <a:p>
-            <a:r>
-              <a:rPr lang="en-US" dirty="0"/>
-              <a:t>Container vs Image</a:t>
-            </a:r>
-          </a:p>
-        </p:txBody>
-      </p:sp>
-      <p:sp>
-        <p:nvSpPr>
-          <p:cNvPr id="7" name="Content Placeholder 6">
-            <a:extLst>
-              <a:ext uri="{FF2B5EF4-FFF2-40B4-BE49-F238E27FC236}">
-                <a16:creationId xmlns:a16="http://schemas.microsoft.com/office/drawing/2014/main" id="{9FB1E5C2-D011-16F5-56BC-7DB2635A7B01}"/>
-              </a:ext>
-            </a:extLst>
-          </p:cNvPr>
-          <p:cNvSpPr>
-            <a:spLocks noGrp="1"/>
-          </p:cNvSpPr>
-          <p:nvPr>
-            <p:ph idx="1"/>
-          </p:nvPr>
-        </p:nvSpPr>
-        <p:spPr/>
-        <p:txBody>
-          <a:bodyPr/>
-          <a:lstStyle/>
-          <a:p>
-            <a:r>
-              <a:rPr lang="en-US" dirty="0"/>
-              <a:t>Containers run from immutable images</a:t>
-            </a:r>
-          </a:p>
-          <a:p>
-            <a:r>
-              <a:rPr lang="en-US" dirty="0"/>
-              <a:t>So how are we writing a file???</a:t>
-            </a:r>
-          </a:p>
-          <a:p>
-            <a:r>
-              <a:rPr lang="en-US" dirty="0"/>
-              <a:t>Each container gets a R/W layer that is shimmed on top of the images</a:t>
-            </a:r>
-          </a:p>
-          <a:p>
-            <a:pPr lvl="1"/>
-            <a:r>
-              <a:rPr lang="en-US" dirty="0"/>
-              <a:t>R/W layer </a:t>
-            </a:r>
-            <a:r>
-              <a:rPr lang="en-US" i="1" dirty="0"/>
-              <a:t>saved</a:t>
-            </a:r>
-            <a:r>
-              <a:rPr lang="en-US" dirty="0"/>
-              <a:t> when container is </a:t>
-            </a:r>
-            <a:r>
-              <a:rPr lang="en-US" i="1" dirty="0"/>
-              <a:t>stopped</a:t>
-            </a:r>
-            <a:endParaRPr lang="en-US" dirty="0"/>
-          </a:p>
-          <a:p>
-            <a:pPr lvl="1"/>
-            <a:r>
-              <a:rPr lang="en-US" i="1" dirty="0"/>
-              <a:t>Deleted</a:t>
-            </a:r>
-            <a:r>
-              <a:rPr lang="en-US" dirty="0"/>
-              <a:t> when container is </a:t>
-            </a:r>
-            <a:r>
-              <a:rPr lang="en-US" i="1" dirty="0"/>
-              <a:t>removed</a:t>
-            </a:r>
-          </a:p>
-          <a:p>
-            <a:endParaRPr lang="en-US" dirty="0"/>
-          </a:p>
-        </p:txBody>
-      </p:sp>
-      <p:sp>
-        <p:nvSpPr>
-          <p:cNvPr id="5" name="Slide Number Placeholder 4">
-            <a:extLst>
-              <a:ext uri="{FF2B5EF4-FFF2-40B4-BE49-F238E27FC236}">
-                <a16:creationId xmlns:a16="http://schemas.microsoft.com/office/drawing/2014/main" id="{1115069B-1B32-5AE3-1060-426423F73330}"/>
-              </a:ext>
-            </a:extLst>
-          </p:cNvPr>
-          <p:cNvSpPr>
-            <a:spLocks noGrp="1"/>
-          </p:cNvSpPr>
-          <p:nvPr>
-            <p:ph type="sldNum" sz="quarter" idx="11"/>
-          </p:nvPr>
-        </p:nvSpPr>
-        <p:spPr/>
-        <p:txBody>
-          <a:bodyPr/>
-          <a:lstStyle/>
-          <a:p>
-            <a:fld id="{18039B46-FA54-4B70-AC0D-4BB93E2046DD}" type="slidenum">
-              <a:rPr lang="en-US" smtClean="0"/>
-              <a:t>28</a:t>
             </a:fld>
             <a:endParaRPr lang="en-US"/>
           </a:p>
@@ -24177,6 +23888,328 @@
 </p:sld>
 </file>
 
+<file path=ppt/slides/slide27.xml><?xml version="1.0" encoding="utf-8"?>
+<p:sld xmlns:a="http://schemas.openxmlformats.org/drawingml/2006/main" xmlns:r="http://schemas.openxmlformats.org/officeDocument/2006/relationships" xmlns:p="http://schemas.openxmlformats.org/presentationml/2006/main">
+  <p:cSld>
+    <p:spTree>
+      <p:nvGrpSpPr>
+        <p:cNvPr id="1" name=""/>
+        <p:cNvGrpSpPr/>
+        <p:nvPr/>
+      </p:nvGrpSpPr>
+      <p:grpSpPr>
+        <a:xfrm>
+          <a:off x="0" y="0"/>
+          <a:ext cx="0" cy="0"/>
+          <a:chOff x="0" y="0"/>
+          <a:chExt cx="0" cy="0"/>
+        </a:xfrm>
+      </p:grpSpPr>
+      <p:sp>
+        <p:nvSpPr>
+          <p:cNvPr id="2" name="Title 1">
+            <a:extLst>
+              <a:ext uri="{FF2B5EF4-FFF2-40B4-BE49-F238E27FC236}">
+                <a16:creationId xmlns:a16="http://schemas.microsoft.com/office/drawing/2014/main" id="{D285A893-9DAA-3F4C-FC1F-A7A7E4E19571}"/>
+              </a:ext>
+            </a:extLst>
+          </p:cNvPr>
+          <p:cNvSpPr>
+            <a:spLocks noGrp="1"/>
+          </p:cNvSpPr>
+          <p:nvPr>
+            <p:ph type="title"/>
+          </p:nvPr>
+        </p:nvSpPr>
+        <p:spPr/>
+        <p:txBody>
+          <a:bodyPr/>
+          <a:lstStyle/>
+          <a:p>
+            <a:r>
+              <a:rPr lang="en-US" dirty="0"/>
+              <a:t>Container Principles</a:t>
+            </a:r>
+          </a:p>
+        </p:txBody>
+      </p:sp>
+      <p:sp>
+        <p:nvSpPr>
+          <p:cNvPr id="3" name="Content Placeholder 2">
+            <a:extLst>
+              <a:ext uri="{FF2B5EF4-FFF2-40B4-BE49-F238E27FC236}">
+                <a16:creationId xmlns:a16="http://schemas.microsoft.com/office/drawing/2014/main" id="{C5E57029-C41A-124A-EF02-DC1E9073C2F6}"/>
+              </a:ext>
+            </a:extLst>
+          </p:cNvPr>
+          <p:cNvSpPr>
+            <a:spLocks noGrp="1"/>
+          </p:cNvSpPr>
+          <p:nvPr>
+            <p:ph idx="1"/>
+          </p:nvPr>
+        </p:nvSpPr>
+        <p:spPr/>
+        <p:txBody>
+          <a:bodyPr/>
+          <a:lstStyle/>
+          <a:p>
+            <a:r>
+              <a:rPr lang="en-US" dirty="0"/>
+              <a:t>Designed to be short-lived and ephemeral</a:t>
+            </a:r>
+          </a:p>
+          <a:p>
+            <a:pPr lvl="1"/>
+            <a:r>
+              <a:rPr lang="en-US" dirty="0"/>
+              <a:t>Stop once their “entry point” finishes</a:t>
+            </a:r>
+          </a:p>
+          <a:p>
+            <a:pPr lvl="1"/>
+            <a:r>
+              <a:rPr lang="en-US" dirty="0"/>
+              <a:t>Spin them up / tear them down as needed</a:t>
+            </a:r>
+          </a:p>
+          <a:p>
+            <a:r>
+              <a:rPr lang="en-US" dirty="0"/>
+              <a:t>Run command always starts a </a:t>
+            </a:r>
+            <a:r>
+              <a:rPr lang="en-US" i="1" dirty="0"/>
+              <a:t>new </a:t>
+            </a:r>
+            <a:r>
+              <a:rPr lang="en-US" dirty="0"/>
+              <a:t>container</a:t>
+            </a:r>
+          </a:p>
+          <a:p>
+            <a:r>
+              <a:rPr lang="en-US" dirty="0"/>
+              <a:t>Start/stop work with </a:t>
+            </a:r>
+            <a:r>
+              <a:rPr lang="en-US" i="1" dirty="0"/>
+              <a:t>existing </a:t>
+            </a:r>
+            <a:r>
+              <a:rPr lang="en-US" dirty="0"/>
+              <a:t>containers</a:t>
+            </a:r>
+          </a:p>
+          <a:p>
+            <a:pPr lvl="1"/>
+            <a:endParaRPr lang="en-US" dirty="0"/>
+          </a:p>
+        </p:txBody>
+      </p:sp>
+      <p:sp>
+        <p:nvSpPr>
+          <p:cNvPr id="5" name="Slide Number Placeholder 4">
+            <a:extLst>
+              <a:ext uri="{FF2B5EF4-FFF2-40B4-BE49-F238E27FC236}">
+                <a16:creationId xmlns:a16="http://schemas.microsoft.com/office/drawing/2014/main" id="{E66F4EC2-D255-3B53-CBD9-8D8F4D817D3E}"/>
+              </a:ext>
+            </a:extLst>
+          </p:cNvPr>
+          <p:cNvSpPr>
+            <a:spLocks noGrp="1"/>
+          </p:cNvSpPr>
+          <p:nvPr>
+            <p:ph type="sldNum" sz="quarter" idx="11"/>
+          </p:nvPr>
+        </p:nvSpPr>
+        <p:spPr/>
+        <p:txBody>
+          <a:bodyPr/>
+          <a:lstStyle/>
+          <a:p>
+            <a:fld id="{18039B46-FA54-4B70-AC0D-4BB93E2046DD}" type="slidenum">
+              <a:rPr lang="en-US" smtClean="0"/>
+              <a:t>27</a:t>
+            </a:fld>
+            <a:endParaRPr lang="en-US"/>
+          </a:p>
+        </p:txBody>
+      </p:sp>
+    </p:spTree>
+    <p:extLst>
+      <p:ext uri="{BB962C8B-B14F-4D97-AF65-F5344CB8AC3E}">
+        <p14:creationId xmlns:p14="http://schemas.microsoft.com/office/powerpoint/2010/main" val="2799958272"/>
+      </p:ext>
+    </p:extLst>
+  </p:cSld>
+  <p:clrMapOvr>
+    <a:masterClrMapping/>
+  </p:clrMapOvr>
+</p:sld>
+</file>
+
+<file path=ppt/slides/slide28.xml><?xml version="1.0" encoding="utf-8"?>
+<p:sld xmlns:a="http://schemas.openxmlformats.org/drawingml/2006/main" xmlns:r="http://schemas.openxmlformats.org/officeDocument/2006/relationships" xmlns:p="http://schemas.openxmlformats.org/presentationml/2006/main">
+  <p:cSld>
+    <p:spTree>
+      <p:nvGrpSpPr>
+        <p:cNvPr id="1" name=""/>
+        <p:cNvGrpSpPr/>
+        <p:nvPr/>
+      </p:nvGrpSpPr>
+      <p:grpSpPr>
+        <a:xfrm>
+          <a:off x="0" y="0"/>
+          <a:ext cx="0" cy="0"/>
+          <a:chOff x="0" y="0"/>
+          <a:chExt cx="0" cy="0"/>
+        </a:xfrm>
+      </p:grpSpPr>
+      <p:sp>
+        <p:nvSpPr>
+          <p:cNvPr id="2" name="Title 1">
+            <a:extLst>
+              <a:ext uri="{FF2B5EF4-FFF2-40B4-BE49-F238E27FC236}">
+                <a16:creationId xmlns:a16="http://schemas.microsoft.com/office/drawing/2014/main" id="{3181A64B-9ABC-3000-628A-06CF1265C556}"/>
+              </a:ext>
+            </a:extLst>
+          </p:cNvPr>
+          <p:cNvSpPr>
+            <a:spLocks noGrp="1"/>
+          </p:cNvSpPr>
+          <p:nvPr>
+            <p:ph type="title"/>
+          </p:nvPr>
+        </p:nvSpPr>
+        <p:spPr/>
+        <p:txBody>
+          <a:bodyPr/>
+          <a:lstStyle/>
+          <a:p>
+            <a:r>
+              <a:rPr lang="en-US" dirty="0"/>
+              <a:t>Demo</a:t>
+            </a:r>
+          </a:p>
+        </p:txBody>
+      </p:sp>
+      <p:sp>
+        <p:nvSpPr>
+          <p:cNvPr id="3" name="Content Placeholder 2">
+            <a:extLst>
+              <a:ext uri="{FF2B5EF4-FFF2-40B4-BE49-F238E27FC236}">
+                <a16:creationId xmlns:a16="http://schemas.microsoft.com/office/drawing/2014/main" id="{61E1C52B-5033-8B7F-BFF2-508D10EF1F0B}"/>
+              </a:ext>
+            </a:extLst>
+          </p:cNvPr>
+          <p:cNvSpPr>
+            <a:spLocks noGrp="1"/>
+          </p:cNvSpPr>
+          <p:nvPr>
+            <p:ph sz="half" idx="1"/>
+          </p:nvPr>
+        </p:nvSpPr>
+        <p:spPr/>
+        <p:txBody>
+          <a:bodyPr/>
+          <a:lstStyle/>
+          <a:p>
+            <a:r>
+              <a:rPr lang="en-US" dirty="0"/>
+              <a:t>docker container run -it alpine</a:t>
+            </a:r>
+          </a:p>
+          <a:p>
+            <a:r>
+              <a:rPr lang="en-US" dirty="0"/>
+              <a:t>echo hello &gt; test.txt</a:t>
+            </a:r>
+          </a:p>
+          <a:p>
+            <a:r>
+              <a:rPr lang="en-US" dirty="0"/>
+              <a:t>cat test.txt</a:t>
+            </a:r>
+          </a:p>
+          <a:p>
+            <a:r>
+              <a:rPr lang="en-US" dirty="0"/>
+              <a:t>Use docker desktop to inspect filesystem</a:t>
+            </a:r>
+          </a:p>
+          <a:p>
+            <a:endParaRPr lang="en-US" dirty="0"/>
+          </a:p>
+        </p:txBody>
+      </p:sp>
+      <p:sp>
+        <p:nvSpPr>
+          <p:cNvPr id="5" name="Footer Placeholder 4">
+            <a:extLst>
+              <a:ext uri="{FF2B5EF4-FFF2-40B4-BE49-F238E27FC236}">
+                <a16:creationId xmlns:a16="http://schemas.microsoft.com/office/drawing/2014/main" id="{5B9FAC41-9DED-93AD-F4A4-74C637581EC2}"/>
+              </a:ext>
+            </a:extLst>
+          </p:cNvPr>
+          <p:cNvSpPr>
+            <a:spLocks noGrp="1"/>
+          </p:cNvSpPr>
+          <p:nvPr>
+            <p:ph type="ftr" sz="quarter" idx="11"/>
+          </p:nvPr>
+        </p:nvSpPr>
+        <p:spPr/>
+        <p:txBody>
+          <a:bodyPr/>
+          <a:lstStyle/>
+          <a:p>
+            <a:endParaRPr lang="en-US"/>
+          </a:p>
+        </p:txBody>
+      </p:sp>
+      <p:sp>
+        <p:nvSpPr>
+          <p:cNvPr id="6" name="Slide Number Placeholder 5">
+            <a:extLst>
+              <a:ext uri="{FF2B5EF4-FFF2-40B4-BE49-F238E27FC236}">
+                <a16:creationId xmlns:a16="http://schemas.microsoft.com/office/drawing/2014/main" id="{872139EB-8E23-4F7B-F020-13312A40CFC9}"/>
+              </a:ext>
+            </a:extLst>
+          </p:cNvPr>
+          <p:cNvSpPr>
+            <a:spLocks noGrp="1"/>
+          </p:cNvSpPr>
+          <p:nvPr>
+            <p:ph type="sldNum" sz="quarter" idx="12"/>
+          </p:nvPr>
+        </p:nvSpPr>
+        <p:spPr/>
+        <p:txBody>
+          <a:bodyPr/>
+          <a:lstStyle/>
+          <a:p>
+            <a:fld id="{18039B46-FA54-4B70-AC0D-4BB93E2046DD}" type="slidenum">
+              <a:rPr lang="en-US" smtClean="0"/>
+              <a:t>28</a:t>
+            </a:fld>
+            <a:endParaRPr lang="en-US"/>
+          </a:p>
+        </p:txBody>
+      </p:sp>
+    </p:spTree>
+    <p:extLst>
+      <p:ext uri="{BB962C8B-B14F-4D97-AF65-F5344CB8AC3E}">
+        <p14:creationId xmlns:p14="http://schemas.microsoft.com/office/powerpoint/2010/main" val="1179256607"/>
+      </p:ext>
+    </p:extLst>
+  </p:cSld>
+  <p:clrMapOvr>
+    <a:masterClrMapping/>
+  </p:clrMapOvr>
+</p:sld>
+</file>
+
 <file path=ppt/slides/slide29.xml><?xml version="1.0" encoding="utf-8"?>
 <p:sld xmlns:a="http://schemas.openxmlformats.org/drawingml/2006/main" xmlns:r="http://schemas.openxmlformats.org/officeDocument/2006/relationships" xmlns:p="http://schemas.openxmlformats.org/presentationml/2006/main">
   <p:cSld>
@@ -24196,10 +24229,10 @@
       </p:grpSpPr>
       <p:sp>
         <p:nvSpPr>
-          <p:cNvPr id="2" name="Title 1">
-            <a:extLst>
-              <a:ext uri="{FF2B5EF4-FFF2-40B4-BE49-F238E27FC236}">
-                <a16:creationId xmlns:a16="http://schemas.microsoft.com/office/drawing/2014/main" id="{D285A893-9DAA-3F4C-FC1F-A7A7E4E19571}"/>
+          <p:cNvPr id="6" name="Title 5">
+            <a:extLst>
+              <a:ext uri="{FF2B5EF4-FFF2-40B4-BE49-F238E27FC236}">
+                <a16:creationId xmlns:a16="http://schemas.microsoft.com/office/drawing/2014/main" id="{282EA3DB-FEE0-084F-E004-49822CEBE342}"/>
               </a:ext>
             </a:extLst>
           </p:cNvPr>
@@ -24217,25 +24250,25 @@
           <a:p>
             <a:r>
               <a:rPr lang="en-US" dirty="0"/>
-              <a:t>Container Principles</a:t>
-            </a:r>
-          </a:p>
-        </p:txBody>
-      </p:sp>
-      <p:sp>
-        <p:nvSpPr>
-          <p:cNvPr id="3" name="Content Placeholder 2">
-            <a:extLst>
-              <a:ext uri="{FF2B5EF4-FFF2-40B4-BE49-F238E27FC236}">
-                <a16:creationId xmlns:a16="http://schemas.microsoft.com/office/drawing/2014/main" id="{C5E57029-C41A-124A-EF02-DC1E9073C2F6}"/>
-              </a:ext>
-            </a:extLst>
-          </p:cNvPr>
-          <p:cNvSpPr>
-            <a:spLocks noGrp="1"/>
-          </p:cNvSpPr>
-          <p:nvPr>
-            <p:ph idx="1"/>
+              <a:t>Docker cheat sheet</a:t>
+            </a:r>
+          </a:p>
+        </p:txBody>
+      </p:sp>
+      <p:sp>
+        <p:nvSpPr>
+          <p:cNvPr id="5" name="Slide Number Placeholder 4">
+            <a:extLst>
+              <a:ext uri="{FF2B5EF4-FFF2-40B4-BE49-F238E27FC236}">
+                <a16:creationId xmlns:a16="http://schemas.microsoft.com/office/drawing/2014/main" id="{024D4CF2-3ED5-B401-BBAC-FA85B485C45F}"/>
+              </a:ext>
+            </a:extLst>
+          </p:cNvPr>
+          <p:cNvSpPr>
+            <a:spLocks noGrp="1"/>
+          </p:cNvSpPr>
+          <p:nvPr>
+            <p:ph type="sldNum" sz="quarter" idx="11"/>
           </p:nvPr>
         </p:nvSpPr>
         <p:spPr/>
@@ -24243,92 +24276,59 @@
           <a:bodyPr/>
           <a:lstStyle/>
           <a:p>
-            <a:r>
-              <a:rPr lang="en-US" dirty="0"/>
-              <a:t>Designed to be short-lived and ephemeral</a:t>
-            </a:r>
-          </a:p>
-          <a:p>
-            <a:pPr lvl="1"/>
-            <a:r>
-              <a:rPr lang="en-US" dirty="0"/>
-              <a:t>Stop once their “entry point” finishes</a:t>
-            </a:r>
-          </a:p>
-          <a:p>
-            <a:pPr lvl="1"/>
-            <a:r>
-              <a:rPr lang="en-US" dirty="0"/>
-              <a:t>Spin them up / tear them down as needed</a:t>
-            </a:r>
-          </a:p>
-          <a:p>
-            <a:r>
-              <a:rPr lang="en-US" dirty="0"/>
-              <a:t>Run command always starts a </a:t>
-            </a:r>
-            <a:r>
-              <a:rPr lang="en-US" i="1" dirty="0"/>
-              <a:t>new </a:t>
-            </a:r>
-            <a:r>
-              <a:rPr lang="en-US" dirty="0"/>
-              <a:t>container</a:t>
-            </a:r>
-          </a:p>
-          <a:p>
-            <a:r>
-              <a:rPr lang="en-US" dirty="0"/>
-              <a:t>Start/stop work with </a:t>
-            </a:r>
-            <a:r>
-              <a:rPr lang="en-US" i="1" dirty="0"/>
-              <a:t>existing </a:t>
-            </a:r>
-            <a:r>
-              <a:rPr lang="en-US" dirty="0"/>
-              <a:t>containers</a:t>
-            </a:r>
-          </a:p>
-          <a:p>
-            <a:pPr lvl="1"/>
-            <a:endParaRPr lang="en-US" dirty="0"/>
-          </a:p>
-        </p:txBody>
-      </p:sp>
-      <p:sp>
-        <p:nvSpPr>
-          <p:cNvPr id="5" name="Slide Number Placeholder 4">
-            <a:extLst>
-              <a:ext uri="{FF2B5EF4-FFF2-40B4-BE49-F238E27FC236}">
-                <a16:creationId xmlns:a16="http://schemas.microsoft.com/office/drawing/2014/main" id="{E66F4EC2-D255-3B53-CBD9-8D8F4D817D3E}"/>
-              </a:ext>
-            </a:extLst>
-          </p:cNvPr>
-          <p:cNvSpPr>
-            <a:spLocks noGrp="1"/>
-          </p:cNvSpPr>
-          <p:nvPr>
-            <p:ph type="sldNum" sz="quarter" idx="11"/>
-          </p:nvPr>
-        </p:nvSpPr>
-        <p:spPr/>
-        <p:txBody>
-          <a:bodyPr/>
-          <a:lstStyle/>
-          <a:p>
             <a:fld id="{18039B46-FA54-4B70-AC0D-4BB93E2046DD}" type="slidenum">
               <a:rPr lang="en-US" smtClean="0"/>
+              <a:pPr/>
               <a:t>29</a:t>
             </a:fld>
             <a:endParaRPr lang="en-US"/>
           </a:p>
         </p:txBody>
       </p:sp>
+      <p:sp>
+        <p:nvSpPr>
+          <p:cNvPr id="4" name="Footer Placeholder 3">
+            <a:extLst>
+              <a:ext uri="{FF2B5EF4-FFF2-40B4-BE49-F238E27FC236}">
+                <a16:creationId xmlns:a16="http://schemas.microsoft.com/office/drawing/2014/main" id="{DE47DE72-CD17-26B1-4512-C7D7FC4E5BB3}"/>
+              </a:ext>
+            </a:extLst>
+          </p:cNvPr>
+          <p:cNvSpPr>
+            <a:spLocks noGrp="1"/>
+          </p:cNvSpPr>
+          <p:nvPr>
+            <p:ph type="ftr" sz="quarter" idx="4294967295"/>
+          </p:nvPr>
+        </p:nvSpPr>
+        <p:spPr>
+          <a:xfrm>
+            <a:off x="548640" y="1600198"/>
+            <a:ext cx="4114800" cy="365125"/>
+          </a:xfrm>
+          <a:prstGeom prst="rect">
+            <a:avLst/>
+          </a:prstGeom>
+        </p:spPr>
+        <p:txBody>
+          <a:bodyPr/>
+          <a:lstStyle/>
+          <a:p>
+            <a:r>
+              <a:rPr lang="en-US" dirty="0">
+                <a:solidFill>
+                  <a:schemeClr val="bg1"/>
+                </a:solidFill>
+              </a:rPr>
+              <a:t>https://docs.docker.com/get-started/docker_cheatsheet.pdf</a:t>
+            </a:r>
+          </a:p>
+        </p:txBody>
+      </p:sp>
     </p:spTree>
     <p:extLst>
       <p:ext uri="{BB962C8B-B14F-4D97-AF65-F5344CB8AC3E}">
-        <p14:creationId xmlns:p14="http://schemas.microsoft.com/office/powerpoint/2010/main" val="2799958272"/>
+        <p14:creationId xmlns:p14="http://schemas.microsoft.com/office/powerpoint/2010/main" val="1694393340"/>
       </p:ext>
     </p:extLst>
   </p:cSld>

</xml_diff>